<commit_message>
Ajout de la page Presentation du projet
dans le diaporama
</commit_message>
<xml_diff>
--- a/oral_projet/diaporama_revue_1.pptx
+++ b/oral_projet/diaporama_revue_1.pptx
@@ -9,7 +9,7 @@
   </p:notesMasterIdLst>
   <p:sldIdLst>
     <p:sldId id="256" r:id="rId2"/>
-    <p:sldId id="257" r:id="rId3"/>
+    <p:sldId id="259" r:id="rId3"/>
     <p:sldId id="258" r:id="rId4"/>
   </p:sldIdLst>
   <p:sldSz cx="12192000" cy="6858000"/>
@@ -4848,10 +4848,685 @@
           </a:p>
         </p:txBody>
       </p:sp>
+      <p:pic>
+        <p:nvPicPr>
+          <p:cNvPr id="9" name="Image 8">
+            <a:extLst>
+              <a:ext uri="{FF2B5EF4-FFF2-40B4-BE49-F238E27FC236}">
+                <a16:creationId xmlns:a16="http://schemas.microsoft.com/office/drawing/2014/main" id="{0F6F14B4-4360-483A-A366-B8BC1C433D45}"/>
+              </a:ext>
+            </a:extLst>
+          </p:cNvPr>
+          <p:cNvPicPr>
+            <a:picLocks noChangeAspect="1"/>
+          </p:cNvPicPr>
+          <p:nvPr/>
+        </p:nvPicPr>
+        <p:blipFill>
+          <a:blip r:embed="rId4">
+            <a:duotone>
+              <a:schemeClr val="accent2">
+                <a:shade val="45000"/>
+                <a:satMod val="135000"/>
+              </a:schemeClr>
+              <a:prstClr val="white"/>
+            </a:duotone>
+            <a:extLst>
+              <a:ext uri="{28A0092B-C50C-407E-A947-70E740481C1C}">
+                <a14:useLocalDpi xmlns:a14="http://schemas.microsoft.com/office/drawing/2010/main" val="0"/>
+              </a:ext>
+            </a:extLst>
+          </a:blip>
+          <a:stretch>
+            <a:fillRect/>
+          </a:stretch>
+        </p:blipFill>
+        <p:spPr>
+          <a:xfrm>
+            <a:off x="2003103" y="2553363"/>
+            <a:ext cx="325145" cy="325145"/>
+          </a:xfrm>
+          <a:prstGeom prst="rect">
+            <a:avLst/>
+          </a:prstGeom>
+        </p:spPr>
+      </p:pic>
+      <p:sp>
+        <p:nvSpPr>
+          <p:cNvPr id="11" name="ZoneTexte 10">
+            <a:extLst>
+              <a:ext uri="{FF2B5EF4-FFF2-40B4-BE49-F238E27FC236}">
+                <a16:creationId xmlns:a16="http://schemas.microsoft.com/office/drawing/2014/main" id="{2CA80E90-DA54-463B-A9BF-FCEFEDE559B8}"/>
+              </a:ext>
+            </a:extLst>
+          </p:cNvPr>
+          <p:cNvSpPr txBox="1"/>
+          <p:nvPr/>
+        </p:nvSpPr>
+        <p:spPr>
+          <a:xfrm>
+            <a:off x="2598862" y="2386341"/>
+            <a:ext cx="6223276" cy="646331"/>
+          </a:xfrm>
+          <a:prstGeom prst="rect">
+            <a:avLst/>
+          </a:prstGeom>
+          <a:noFill/>
+        </p:spPr>
+        <p:txBody>
+          <a:bodyPr wrap="square" rtlCol="0">
+            <a:spAutoFit/>
+          </a:bodyPr>
+          <a:lstStyle/>
+          <a:p>
+            <a:pPr algn="just"/>
+            <a:r>
+              <a:rPr lang="fr-FR" i="1" dirty="0">
+                <a:latin typeface="+mj-lt"/>
+              </a:rPr>
+              <a:t>Le Groupe Olivier est spécialisé dans la production de tomates et concombres sous serres verre dans la région nantaise.</a:t>
+            </a:r>
+          </a:p>
+        </p:txBody>
+      </p:sp>
+      <p:sp>
+        <p:nvSpPr>
+          <p:cNvPr id="21" name="ZoneTexte 20">
+            <a:extLst>
+              <a:ext uri="{FF2B5EF4-FFF2-40B4-BE49-F238E27FC236}">
+                <a16:creationId xmlns:a16="http://schemas.microsoft.com/office/drawing/2014/main" id="{A2AA1468-6861-4A75-810C-8AF0C9B7B556}"/>
+              </a:ext>
+            </a:extLst>
+          </p:cNvPr>
+          <p:cNvSpPr txBox="1"/>
+          <p:nvPr/>
+        </p:nvSpPr>
+        <p:spPr>
+          <a:xfrm>
+            <a:off x="416653" y="3170609"/>
+            <a:ext cx="11358694" cy="1754326"/>
+          </a:xfrm>
+          <a:prstGeom prst="rect">
+            <a:avLst/>
+          </a:prstGeom>
+          <a:noFill/>
+        </p:spPr>
+        <p:txBody>
+          <a:bodyPr wrap="square" rtlCol="0">
+            <a:spAutoFit/>
+          </a:bodyPr>
+          <a:lstStyle/>
+          <a:p>
+            <a:pPr algn="ctr"/>
+            <a:r>
+              <a:rPr lang="fr-FR" dirty="0">
+                <a:latin typeface="+mj-lt"/>
+              </a:rPr>
+              <a:t>Ainsi, l’entreprise voudrait superviser l’état de la serre, tout en récupérant et stockant l’ensemble des données suivantes :</a:t>
+            </a:r>
+          </a:p>
+          <a:p>
+            <a:pPr lvl="5"/>
+            <a:r>
+              <a:rPr lang="fr-FR" i="1" dirty="0">
+                <a:latin typeface="+mj-lt"/>
+              </a:rPr>
+              <a:t>L’intensité lumineuse</a:t>
+            </a:r>
+          </a:p>
+          <a:p>
+            <a:pPr lvl="5"/>
+            <a:r>
+              <a:rPr lang="fr-FR" i="1" dirty="0">
+                <a:latin typeface="+mj-lt"/>
+              </a:rPr>
+              <a:t>La pluviométrie</a:t>
+            </a:r>
+          </a:p>
+          <a:p>
+            <a:pPr lvl="5"/>
+            <a:r>
+              <a:rPr lang="fr-FR" i="1" dirty="0">
+                <a:latin typeface="+mj-lt"/>
+              </a:rPr>
+              <a:t>La force et la direction du vent</a:t>
+            </a:r>
+          </a:p>
+          <a:p>
+            <a:pPr lvl="5"/>
+            <a:r>
+              <a:rPr lang="fr-FR" i="1" dirty="0">
+                <a:latin typeface="+mj-lt"/>
+              </a:rPr>
+              <a:t>La température à l’intérieur de la serre</a:t>
+            </a:r>
+          </a:p>
+          <a:p>
+            <a:pPr lvl="5"/>
+            <a:r>
+              <a:rPr lang="fr-FR" i="1" dirty="0">
+                <a:latin typeface="+mj-lt"/>
+              </a:rPr>
+              <a:t>La température de l’eau des tuyaux de chauffage</a:t>
+            </a:r>
+          </a:p>
+        </p:txBody>
+      </p:sp>
+      <p:pic>
+        <p:nvPicPr>
+          <p:cNvPr id="13" name="Image 12">
+            <a:extLst>
+              <a:ext uri="{FF2B5EF4-FFF2-40B4-BE49-F238E27FC236}">
+                <a16:creationId xmlns:a16="http://schemas.microsoft.com/office/drawing/2014/main" id="{E9CB450B-671B-4A08-AECA-606B1B490A84}"/>
+              </a:ext>
+            </a:extLst>
+          </p:cNvPr>
+          <p:cNvPicPr>
+            <a:picLocks noChangeAspect="1"/>
+          </p:cNvPicPr>
+          <p:nvPr/>
+        </p:nvPicPr>
+        <p:blipFill>
+          <a:blip r:embed="rId5">
+            <a:duotone>
+              <a:schemeClr val="accent6">
+                <a:shade val="45000"/>
+                <a:satMod val="135000"/>
+              </a:schemeClr>
+              <a:prstClr val="white"/>
+            </a:duotone>
+            <a:extLst>
+              <a:ext uri="{28A0092B-C50C-407E-A947-70E740481C1C}">
+                <a14:useLocalDpi xmlns:a14="http://schemas.microsoft.com/office/drawing/2010/main" val="0"/>
+              </a:ext>
+            </a:extLst>
+          </a:blip>
+          <a:stretch>
+            <a:fillRect/>
+          </a:stretch>
+        </p:blipFill>
+        <p:spPr>
+          <a:xfrm>
+            <a:off x="2516748" y="3592821"/>
+            <a:ext cx="124309" cy="124309"/>
+          </a:xfrm>
+          <a:prstGeom prst="rect">
+            <a:avLst/>
+          </a:prstGeom>
+        </p:spPr>
+      </p:pic>
+      <p:pic>
+        <p:nvPicPr>
+          <p:cNvPr id="24" name="Image 23">
+            <a:extLst>
+              <a:ext uri="{FF2B5EF4-FFF2-40B4-BE49-F238E27FC236}">
+                <a16:creationId xmlns:a16="http://schemas.microsoft.com/office/drawing/2014/main" id="{E7D07084-514E-4AD1-92AD-6F485AC56BE8}"/>
+              </a:ext>
+            </a:extLst>
+          </p:cNvPr>
+          <p:cNvPicPr>
+            <a:picLocks noChangeAspect="1"/>
+          </p:cNvPicPr>
+          <p:nvPr/>
+        </p:nvPicPr>
+        <p:blipFill>
+          <a:blip r:embed="rId5">
+            <a:duotone>
+              <a:schemeClr val="accent6">
+                <a:shade val="45000"/>
+                <a:satMod val="135000"/>
+              </a:schemeClr>
+              <a:prstClr val="white"/>
+            </a:duotone>
+            <a:extLst>
+              <a:ext uri="{28A0092B-C50C-407E-A947-70E740481C1C}">
+                <a14:useLocalDpi xmlns:a14="http://schemas.microsoft.com/office/drawing/2010/main" val="0"/>
+              </a:ext>
+            </a:extLst>
+          </a:blip>
+          <a:stretch>
+            <a:fillRect/>
+          </a:stretch>
+        </p:blipFill>
+        <p:spPr>
+          <a:xfrm>
+            <a:off x="2517977" y="3855927"/>
+            <a:ext cx="124309" cy="124309"/>
+          </a:xfrm>
+          <a:prstGeom prst="rect">
+            <a:avLst/>
+          </a:prstGeom>
+        </p:spPr>
+      </p:pic>
+      <p:pic>
+        <p:nvPicPr>
+          <p:cNvPr id="25" name="Image 24">
+            <a:extLst>
+              <a:ext uri="{FF2B5EF4-FFF2-40B4-BE49-F238E27FC236}">
+                <a16:creationId xmlns:a16="http://schemas.microsoft.com/office/drawing/2014/main" id="{2BE9EB8A-90B5-4FCA-9550-B98A27AF7474}"/>
+              </a:ext>
+            </a:extLst>
+          </p:cNvPr>
+          <p:cNvPicPr>
+            <a:picLocks noChangeAspect="1"/>
+          </p:cNvPicPr>
+          <p:nvPr/>
+        </p:nvPicPr>
+        <p:blipFill>
+          <a:blip r:embed="rId5">
+            <a:duotone>
+              <a:schemeClr val="accent6">
+                <a:shade val="45000"/>
+                <a:satMod val="135000"/>
+              </a:schemeClr>
+              <a:prstClr val="white"/>
+            </a:duotone>
+            <a:extLst>
+              <a:ext uri="{28A0092B-C50C-407E-A947-70E740481C1C}">
+                <a14:useLocalDpi xmlns:a14="http://schemas.microsoft.com/office/drawing/2010/main" val="0"/>
+              </a:ext>
+            </a:extLst>
+          </a:blip>
+          <a:stretch>
+            <a:fillRect/>
+          </a:stretch>
+        </p:blipFill>
+        <p:spPr>
+          <a:xfrm>
+            <a:off x="2518549" y="4139342"/>
+            <a:ext cx="124309" cy="124309"/>
+          </a:xfrm>
+          <a:prstGeom prst="rect">
+            <a:avLst/>
+          </a:prstGeom>
+        </p:spPr>
+      </p:pic>
+      <p:pic>
+        <p:nvPicPr>
+          <p:cNvPr id="27" name="Image 26">
+            <a:extLst>
+              <a:ext uri="{FF2B5EF4-FFF2-40B4-BE49-F238E27FC236}">
+                <a16:creationId xmlns:a16="http://schemas.microsoft.com/office/drawing/2014/main" id="{48536EA0-A655-484B-9344-6480C35E430D}"/>
+              </a:ext>
+            </a:extLst>
+          </p:cNvPr>
+          <p:cNvPicPr>
+            <a:picLocks noChangeAspect="1"/>
+          </p:cNvPicPr>
+          <p:nvPr/>
+        </p:nvPicPr>
+        <p:blipFill>
+          <a:blip r:embed="rId5">
+            <a:duotone>
+              <a:schemeClr val="accent6">
+                <a:shade val="45000"/>
+                <a:satMod val="135000"/>
+              </a:schemeClr>
+              <a:prstClr val="white"/>
+            </a:duotone>
+            <a:extLst>
+              <a:ext uri="{28A0092B-C50C-407E-A947-70E740481C1C}">
+                <a14:useLocalDpi xmlns:a14="http://schemas.microsoft.com/office/drawing/2010/main" val="0"/>
+              </a:ext>
+            </a:extLst>
+          </a:blip>
+          <a:stretch>
+            <a:fillRect/>
+          </a:stretch>
+        </p:blipFill>
+        <p:spPr>
+          <a:xfrm>
+            <a:off x="2511067" y="4401588"/>
+            <a:ext cx="124309" cy="124309"/>
+          </a:xfrm>
+          <a:prstGeom prst="rect">
+            <a:avLst/>
+          </a:prstGeom>
+        </p:spPr>
+      </p:pic>
+      <p:pic>
+        <p:nvPicPr>
+          <p:cNvPr id="28" name="Image 27">
+            <a:extLst>
+              <a:ext uri="{FF2B5EF4-FFF2-40B4-BE49-F238E27FC236}">
+                <a16:creationId xmlns:a16="http://schemas.microsoft.com/office/drawing/2014/main" id="{46714A47-0025-41A2-8A6D-C200E5144DED}"/>
+              </a:ext>
+            </a:extLst>
+          </p:cNvPr>
+          <p:cNvPicPr>
+            <a:picLocks noChangeAspect="1"/>
+          </p:cNvPicPr>
+          <p:nvPr/>
+        </p:nvPicPr>
+        <p:blipFill>
+          <a:blip r:embed="rId5">
+            <a:duotone>
+              <a:schemeClr val="accent6">
+                <a:shade val="45000"/>
+                <a:satMod val="135000"/>
+              </a:schemeClr>
+              <a:prstClr val="white"/>
+            </a:duotone>
+            <a:extLst>
+              <a:ext uri="{28A0092B-C50C-407E-A947-70E740481C1C}">
+                <a14:useLocalDpi xmlns:a14="http://schemas.microsoft.com/office/drawing/2010/main" val="0"/>
+              </a:ext>
+            </a:extLst>
+          </a:blip>
+          <a:stretch>
+            <a:fillRect/>
+          </a:stretch>
+        </p:blipFill>
+        <p:spPr>
+          <a:xfrm>
+            <a:off x="2507223" y="4667670"/>
+            <a:ext cx="124309" cy="124309"/>
+          </a:xfrm>
+          <a:prstGeom prst="rect">
+            <a:avLst/>
+          </a:prstGeom>
+        </p:spPr>
+      </p:pic>
+      <p:pic>
+        <p:nvPicPr>
+          <p:cNvPr id="15" name="Image 14">
+            <a:extLst>
+              <a:ext uri="{FF2B5EF4-FFF2-40B4-BE49-F238E27FC236}">
+                <a16:creationId xmlns:a16="http://schemas.microsoft.com/office/drawing/2014/main" id="{CDC3D37B-A324-4A91-89E6-460E6D5F11C2}"/>
+              </a:ext>
+            </a:extLst>
+          </p:cNvPr>
+          <p:cNvPicPr>
+            <a:picLocks noChangeAspect="1"/>
+          </p:cNvPicPr>
+          <p:nvPr/>
+        </p:nvPicPr>
+        <p:blipFill>
+          <a:blip r:embed="rId6">
+            <a:extLst>
+              <a:ext uri="{28A0092B-C50C-407E-A947-70E740481C1C}">
+                <a14:useLocalDpi xmlns:a14="http://schemas.microsoft.com/office/drawing/2010/main" val="0"/>
+              </a:ext>
+            </a:extLst>
+          </a:blip>
+          <a:stretch>
+            <a:fillRect/>
+          </a:stretch>
+        </p:blipFill>
+        <p:spPr>
+          <a:xfrm>
+            <a:off x="1420331" y="5045402"/>
+            <a:ext cx="369332" cy="369332"/>
+          </a:xfrm>
+          <a:prstGeom prst="rect">
+            <a:avLst/>
+          </a:prstGeom>
+        </p:spPr>
+      </p:pic>
+      <p:sp>
+        <p:nvSpPr>
+          <p:cNvPr id="30" name="ZoneTexte 29">
+            <a:extLst>
+              <a:ext uri="{FF2B5EF4-FFF2-40B4-BE49-F238E27FC236}">
+                <a16:creationId xmlns:a16="http://schemas.microsoft.com/office/drawing/2014/main" id="{55A5D2D9-5E62-454C-B0DB-9062873956DF}"/>
+              </a:ext>
+            </a:extLst>
+          </p:cNvPr>
+          <p:cNvSpPr txBox="1"/>
+          <p:nvPr/>
+        </p:nvSpPr>
+        <p:spPr>
+          <a:xfrm>
+            <a:off x="1915261" y="5032370"/>
+            <a:ext cx="8361478" cy="369332"/>
+          </a:xfrm>
+          <a:prstGeom prst="rect">
+            <a:avLst/>
+          </a:prstGeom>
+          <a:noFill/>
+        </p:spPr>
+        <p:txBody>
+          <a:bodyPr wrap="square" rtlCol="0">
+            <a:spAutoFit/>
+          </a:bodyPr>
+          <a:lstStyle/>
+          <a:p>
+            <a:pPr algn="just"/>
+            <a:r>
+              <a:rPr lang="fr-FR" dirty="0">
+                <a:latin typeface="+mj-lt"/>
+              </a:rPr>
+              <a:t>La Raspberry récupérera automatiquement les données des mesures ci-dessus.</a:t>
+            </a:r>
+          </a:p>
+        </p:txBody>
+      </p:sp>
+      <p:sp>
+        <p:nvSpPr>
+          <p:cNvPr id="31" name="ZoneTexte 30">
+            <a:extLst>
+              <a:ext uri="{FF2B5EF4-FFF2-40B4-BE49-F238E27FC236}">
+                <a16:creationId xmlns:a16="http://schemas.microsoft.com/office/drawing/2014/main" id="{C9657971-4CEF-4260-90C5-06CF74718973}"/>
+              </a:ext>
+            </a:extLst>
+          </p:cNvPr>
+          <p:cNvSpPr txBox="1"/>
+          <p:nvPr/>
+        </p:nvSpPr>
+        <p:spPr>
+          <a:xfrm>
+            <a:off x="1905736" y="5407539"/>
+            <a:ext cx="8361478" cy="369332"/>
+          </a:xfrm>
+          <a:prstGeom prst="rect">
+            <a:avLst/>
+          </a:prstGeom>
+          <a:noFill/>
+        </p:spPr>
+        <p:txBody>
+          <a:bodyPr wrap="square" rtlCol="0">
+            <a:spAutoFit/>
+          </a:bodyPr>
+          <a:lstStyle/>
+          <a:p>
+            <a:pPr algn="just"/>
+            <a:r>
+              <a:rPr lang="fr-FR" dirty="0">
+                <a:latin typeface="+mj-lt"/>
+              </a:rPr>
+              <a:t>La base de données permettra la mémorisation des données sur plusieurs années.</a:t>
+            </a:r>
+          </a:p>
+        </p:txBody>
+      </p:sp>
+      <p:sp>
+        <p:nvSpPr>
+          <p:cNvPr id="33" name="ZoneTexte 32">
+            <a:extLst>
+              <a:ext uri="{FF2B5EF4-FFF2-40B4-BE49-F238E27FC236}">
+                <a16:creationId xmlns:a16="http://schemas.microsoft.com/office/drawing/2014/main" id="{573A5A66-19E9-4869-9A27-C9B54049B2D5}"/>
+              </a:ext>
+            </a:extLst>
+          </p:cNvPr>
+          <p:cNvSpPr txBox="1"/>
+          <p:nvPr/>
+        </p:nvSpPr>
+        <p:spPr>
+          <a:xfrm>
+            <a:off x="1915260" y="5762481"/>
+            <a:ext cx="8791567" cy="369332"/>
+          </a:xfrm>
+          <a:prstGeom prst="rect">
+            <a:avLst/>
+          </a:prstGeom>
+          <a:noFill/>
+        </p:spPr>
+        <p:txBody>
+          <a:bodyPr wrap="square" rtlCol="0">
+            <a:spAutoFit/>
+          </a:bodyPr>
+          <a:lstStyle/>
+          <a:p>
+            <a:pPr algn="just"/>
+            <a:r>
+              <a:rPr lang="fr-FR" dirty="0">
+                <a:latin typeface="+mj-lt"/>
+              </a:rPr>
+              <a:t>Sur l’application web, on consultera les mesures par des histogrammes en temps réel.</a:t>
+            </a:r>
+          </a:p>
+        </p:txBody>
+      </p:sp>
+      <p:sp>
+        <p:nvSpPr>
+          <p:cNvPr id="34" name="ZoneTexte 33">
+            <a:extLst>
+              <a:ext uri="{FF2B5EF4-FFF2-40B4-BE49-F238E27FC236}">
+                <a16:creationId xmlns:a16="http://schemas.microsoft.com/office/drawing/2014/main" id="{61246A66-C1D8-40BC-99EA-CF47F8CDCC51}"/>
+              </a:ext>
+            </a:extLst>
+          </p:cNvPr>
+          <p:cNvSpPr txBox="1"/>
+          <p:nvPr/>
+        </p:nvSpPr>
+        <p:spPr>
+          <a:xfrm>
+            <a:off x="1915261" y="6117423"/>
+            <a:ext cx="8361478" cy="369332"/>
+          </a:xfrm>
+          <a:prstGeom prst="rect">
+            <a:avLst/>
+          </a:prstGeom>
+          <a:noFill/>
+        </p:spPr>
+        <p:txBody>
+          <a:bodyPr wrap="square" rtlCol="0">
+            <a:spAutoFit/>
+          </a:bodyPr>
+          <a:lstStyle/>
+          <a:p>
+            <a:pPr algn="just"/>
+            <a:r>
+              <a:rPr lang="fr-FR" dirty="0">
+                <a:latin typeface="+mj-lt"/>
+              </a:rPr>
+              <a:t>L’application informera en temps réel l’état de fonctionnement du système.</a:t>
+            </a:r>
+          </a:p>
+        </p:txBody>
+      </p:sp>
+      <p:pic>
+        <p:nvPicPr>
+          <p:cNvPr id="18" name="Image 17">
+            <a:extLst>
+              <a:ext uri="{FF2B5EF4-FFF2-40B4-BE49-F238E27FC236}">
+                <a16:creationId xmlns:a16="http://schemas.microsoft.com/office/drawing/2014/main" id="{09EA7E86-A33B-478A-8382-5C4F4C455D18}"/>
+              </a:ext>
+            </a:extLst>
+          </p:cNvPr>
+          <p:cNvPicPr>
+            <a:picLocks noChangeAspect="1"/>
+          </p:cNvPicPr>
+          <p:nvPr/>
+        </p:nvPicPr>
+        <p:blipFill>
+          <a:blip r:embed="rId7">
+            <a:extLst>
+              <a:ext uri="{28A0092B-C50C-407E-A947-70E740481C1C}">
+                <a14:useLocalDpi xmlns:a14="http://schemas.microsoft.com/office/drawing/2010/main" val="0"/>
+              </a:ext>
+            </a:extLst>
+          </a:blip>
+          <a:stretch>
+            <a:fillRect/>
+          </a:stretch>
+        </p:blipFill>
+        <p:spPr>
+          <a:xfrm>
+            <a:off x="1459951" y="5447158"/>
+            <a:ext cx="290093" cy="290093"/>
+          </a:xfrm>
+          <a:prstGeom prst="rect">
+            <a:avLst/>
+          </a:prstGeom>
+        </p:spPr>
+      </p:pic>
+      <p:pic>
+        <p:nvPicPr>
+          <p:cNvPr id="22" name="Image 21" descr="Une image contenant moniteur, intérieur, assis, équipement électronique&#10;&#10;Description générée avec un niveau de confiance élevé">
+            <a:extLst>
+              <a:ext uri="{FF2B5EF4-FFF2-40B4-BE49-F238E27FC236}">
+                <a16:creationId xmlns:a16="http://schemas.microsoft.com/office/drawing/2014/main" id="{84174CA5-FC3F-41DB-9737-58325A5D4692}"/>
+              </a:ext>
+            </a:extLst>
+          </p:cNvPr>
+          <p:cNvPicPr>
+            <a:picLocks noChangeAspect="1"/>
+          </p:cNvPicPr>
+          <p:nvPr/>
+        </p:nvPicPr>
+        <p:blipFill>
+          <a:blip r:embed="rId8">
+            <a:extLst>
+              <a:ext uri="{28A0092B-C50C-407E-A947-70E740481C1C}">
+                <a14:useLocalDpi xmlns:a14="http://schemas.microsoft.com/office/drawing/2010/main" val="0"/>
+              </a:ext>
+            </a:extLst>
+          </a:blip>
+          <a:stretch>
+            <a:fillRect/>
+          </a:stretch>
+        </p:blipFill>
+        <p:spPr>
+          <a:xfrm>
+            <a:off x="1444803" y="5802100"/>
+            <a:ext cx="290094" cy="290094"/>
+          </a:xfrm>
+          <a:prstGeom prst="rect">
+            <a:avLst/>
+          </a:prstGeom>
+        </p:spPr>
+      </p:pic>
+      <p:pic>
+        <p:nvPicPr>
+          <p:cNvPr id="35" name="Image 34">
+            <a:extLst>
+              <a:ext uri="{FF2B5EF4-FFF2-40B4-BE49-F238E27FC236}">
+                <a16:creationId xmlns:a16="http://schemas.microsoft.com/office/drawing/2014/main" id="{8AE03452-C302-4FC9-8ADE-E4DCC88E6D31}"/>
+              </a:ext>
+            </a:extLst>
+          </p:cNvPr>
+          <p:cNvPicPr>
+            <a:picLocks noChangeAspect="1"/>
+          </p:cNvPicPr>
+          <p:nvPr/>
+        </p:nvPicPr>
+        <p:blipFill>
+          <a:blip r:embed="rId9">
+            <a:extLst>
+              <a:ext uri="{28A0092B-C50C-407E-A947-70E740481C1C}">
+                <a14:useLocalDpi xmlns:a14="http://schemas.microsoft.com/office/drawing/2010/main" val="0"/>
+              </a:ext>
+            </a:extLst>
+          </a:blip>
+          <a:stretch>
+            <a:fillRect/>
+          </a:stretch>
+        </p:blipFill>
+        <p:spPr>
+          <a:xfrm>
+            <a:off x="1510158" y="6157043"/>
+            <a:ext cx="291135" cy="291135"/>
+          </a:xfrm>
+          <a:prstGeom prst="rect">
+            <a:avLst/>
+          </a:prstGeom>
+        </p:spPr>
+      </p:pic>
     </p:spTree>
     <p:extLst>
       <p:ext uri="{BB962C8B-B14F-4D97-AF65-F5344CB8AC3E}">
-        <p14:creationId xmlns:p14="http://schemas.microsoft.com/office/powerpoint/2010/main" val="2675700515"/>
+        <p14:creationId xmlns:p14="http://schemas.microsoft.com/office/powerpoint/2010/main" val="3514073518"/>
       </p:ext>
     </p:extLst>
   </p:cSld>

</xml_diff>